<commit_message>
cleaned up PPT for AD Talk
</commit_message>
<xml_diff>
--- a/PS Summit AD Tips and Tricks.pptx
+++ b/PS Summit AD Tips and Tricks.pptx
@@ -6,12 +6,13 @@
   </p:sldMasterIdLst>
   <p:sldIdLst>
     <p:sldId id="256" r:id="rId2"/>
-    <p:sldId id="259" r:id="rId3"/>
-    <p:sldId id="257" r:id="rId4"/>
-    <p:sldId id="258" r:id="rId5"/>
-    <p:sldId id="261" r:id="rId6"/>
-    <p:sldId id="262" r:id="rId7"/>
-    <p:sldId id="264" r:id="rId8"/>
+    <p:sldId id="265" r:id="rId3"/>
+    <p:sldId id="259" r:id="rId4"/>
+    <p:sldId id="257" r:id="rId5"/>
+    <p:sldId id="258" r:id="rId6"/>
+    <p:sldId id="261" r:id="rId7"/>
+    <p:sldId id="262" r:id="rId8"/>
+    <p:sldId id="264" r:id="rId9"/>
   </p:sldIdLst>
   <p:sldSz cx="12192000" cy="6858000"/>
   <p:notesSz cx="6858000" cy="9144000"/>
@@ -288,7 +289,7 @@
           <a:p>
             <a:fld id="{7195C811-8A6E-4F08-9E1B-F289D25AACC3}" type="datetimeFigureOut">
               <a:rPr lang="en-US" smtClean="0"/>
-              <a:t>4/15/2013</a:t>
+              <a:t>4/16/2013</a:t>
             </a:fld>
             <a:endParaRPr lang="en-US"/>
           </a:p>
@@ -555,7 +556,7 @@
           <a:p>
             <a:fld id="{7195C811-8A6E-4F08-9E1B-F289D25AACC3}" type="datetimeFigureOut">
               <a:rPr lang="en-US" smtClean="0"/>
-              <a:t>4/15/2013</a:t>
+              <a:t>4/16/2013</a:t>
             </a:fld>
             <a:endParaRPr lang="en-US"/>
           </a:p>
@@ -786,7 +787,7 @@
           <a:p>
             <a:fld id="{7195C811-8A6E-4F08-9E1B-F289D25AACC3}" type="datetimeFigureOut">
               <a:rPr lang="en-US" smtClean="0"/>
-              <a:t>4/15/2013</a:t>
+              <a:t>4/16/2013</a:t>
             </a:fld>
             <a:endParaRPr lang="en-US"/>
           </a:p>
@@ -1096,7 +1097,7 @@
           <a:p>
             <a:fld id="{7195C811-8A6E-4F08-9E1B-F289D25AACC3}" type="datetimeFigureOut">
               <a:rPr lang="en-US" smtClean="0"/>
-              <a:t>4/15/2013</a:t>
+              <a:t>4/16/2013</a:t>
             </a:fld>
             <a:endParaRPr lang="en-US"/>
           </a:p>
@@ -1569,7 +1570,7 @@
           <a:p>
             <a:fld id="{7195C811-8A6E-4F08-9E1B-F289D25AACC3}" type="datetimeFigureOut">
               <a:rPr lang="en-US" smtClean="0"/>
-              <a:t>4/15/2013</a:t>
+              <a:t>4/16/2013</a:t>
             </a:fld>
             <a:endParaRPr lang="en-US"/>
           </a:p>
@@ -2116,7 +2117,7 @@
           <a:p>
             <a:fld id="{7195C811-8A6E-4F08-9E1B-F289D25AACC3}" type="datetimeFigureOut">
               <a:rPr lang="en-US" smtClean="0"/>
-              <a:t>4/15/2013</a:t>
+              <a:t>4/16/2013</a:t>
             </a:fld>
             <a:endParaRPr lang="en-US"/>
           </a:p>
@@ -2890,7 +2891,7 @@
           <a:p>
             <a:fld id="{7195C811-8A6E-4F08-9E1B-F289D25AACC3}" type="datetimeFigureOut">
               <a:rPr lang="en-US" smtClean="0"/>
-              <a:t>4/15/2013</a:t>
+              <a:t>4/16/2013</a:t>
             </a:fld>
             <a:endParaRPr lang="en-US"/>
           </a:p>
@@ -3065,7 +3066,7 @@
           <a:p>
             <a:fld id="{7195C811-8A6E-4F08-9E1B-F289D25AACC3}" type="datetimeFigureOut">
               <a:rPr lang="en-US" smtClean="0"/>
-              <a:t>4/15/2013</a:t>
+              <a:t>4/16/2013</a:t>
             </a:fld>
             <a:endParaRPr lang="en-US"/>
           </a:p>
@@ -3288,7 +3289,7 @@
           <a:p>
             <a:fld id="{7195C811-8A6E-4F08-9E1B-F289D25AACC3}" type="datetimeFigureOut">
               <a:rPr lang="en-US" smtClean="0"/>
-              <a:t>4/15/2013</a:t>
+              <a:t>4/16/2013</a:t>
             </a:fld>
             <a:endParaRPr lang="en-US"/>
           </a:p>
@@ -3468,7 +3469,7 @@
           <a:p>
             <a:fld id="{7195C811-8A6E-4F08-9E1B-F289D25AACC3}" type="datetimeFigureOut">
               <a:rPr lang="en-US" smtClean="0"/>
-              <a:t>4/15/2013</a:t>
+              <a:t>4/16/2013</a:t>
             </a:fld>
             <a:endParaRPr lang="en-US"/>
           </a:p>
@@ -3757,7 +3758,7 @@
           <a:p>
             <a:fld id="{7195C811-8A6E-4F08-9E1B-F289D25AACC3}" type="datetimeFigureOut">
               <a:rPr lang="en-US" smtClean="0"/>
-              <a:t>4/15/2013</a:t>
+              <a:t>4/16/2013</a:t>
             </a:fld>
             <a:endParaRPr lang="en-US"/>
           </a:p>
@@ -3999,7 +4000,7 @@
           <a:p>
             <a:fld id="{7195C811-8A6E-4F08-9E1B-F289D25AACC3}" type="datetimeFigureOut">
               <a:rPr lang="en-US" smtClean="0"/>
-              <a:t>4/15/2013</a:t>
+              <a:t>4/16/2013</a:t>
             </a:fld>
             <a:endParaRPr lang="en-US"/>
           </a:p>
@@ -4378,7 +4379,7 @@
           <a:p>
             <a:fld id="{7195C811-8A6E-4F08-9E1B-F289D25AACC3}" type="datetimeFigureOut">
               <a:rPr lang="en-US" smtClean="0"/>
-              <a:t>4/15/2013</a:t>
+              <a:t>4/16/2013</a:t>
             </a:fld>
             <a:endParaRPr lang="en-US"/>
           </a:p>
@@ -4496,7 +4497,7 @@
           <a:p>
             <a:fld id="{7195C811-8A6E-4F08-9E1B-F289D25AACC3}" type="datetimeFigureOut">
               <a:rPr lang="en-US" smtClean="0"/>
-              <a:t>4/15/2013</a:t>
+              <a:t>4/16/2013</a:t>
             </a:fld>
             <a:endParaRPr lang="en-US"/>
           </a:p>
@@ -4591,7 +4592,7 @@
           <a:p>
             <a:fld id="{7195C811-8A6E-4F08-9E1B-F289D25AACC3}" type="datetimeFigureOut">
               <a:rPr lang="en-US" smtClean="0"/>
-              <a:t>4/15/2013</a:t>
+              <a:t>4/16/2013</a:t>
             </a:fld>
             <a:endParaRPr lang="en-US"/>
           </a:p>
@@ -4840,7 +4841,7 @@
           <a:p>
             <a:fld id="{7195C811-8A6E-4F08-9E1B-F289D25AACC3}" type="datetimeFigureOut">
               <a:rPr lang="en-US" smtClean="0"/>
-              <a:t>4/15/2013</a:t>
+              <a:t>4/16/2013</a:t>
             </a:fld>
             <a:endParaRPr lang="en-US"/>
           </a:p>
@@ -5097,7 +5098,7 @@
           <a:p>
             <a:fld id="{7195C811-8A6E-4F08-9E1B-F289D25AACC3}" type="datetimeFigureOut">
               <a:rPr lang="en-US" smtClean="0"/>
-              <a:t>4/15/2013</a:t>
+              <a:t>4/16/2013</a:t>
             </a:fld>
             <a:endParaRPr lang="en-US"/>
           </a:p>
@@ -5340,7 +5341,7 @@
           <a:p>
             <a:fld id="{7195C811-8A6E-4F08-9E1B-F289D25AACC3}" type="datetimeFigureOut">
               <a:rPr lang="en-US" smtClean="0"/>
-              <a:t>4/15/2013</a:t>
+              <a:t>4/16/2013</a:t>
             </a:fld>
             <a:endParaRPr lang="en-US"/>
           </a:p>
@@ -5852,7 +5853,7 @@
           <a:p>
             <a:r>
               <a:rPr lang="en-US" dirty="0" smtClean="0"/>
-              <a:t>What I am and am not going to cover</a:t>
+              <a:t>What’s not covered	</a:t>
             </a:r>
             <a:endParaRPr lang="en-US" dirty="0"/>
           </a:p>
@@ -5870,74 +5871,13 @@
         </p:nvSpPr>
         <p:spPr/>
         <p:txBody>
-          <a:bodyPr>
-            <a:normAutofit/>
-          </a:bodyPr>
-          <a:lstStyle/>
-          <a:p>
-            <a:r>
-              <a:rPr lang="en-US" dirty="0"/>
-              <a:t>W</a:t>
-            </a:r>
+          <a:bodyPr/>
+          <a:lstStyle/>
+          <a:p>
             <a:r>
               <a:rPr lang="en-US" dirty="0" smtClean="0"/>
-              <a:t>hy I primarily use PowerShell AD Module from MSFT</a:t>
-            </a:r>
-          </a:p>
-          <a:p>
-            <a:r>
-              <a:rPr lang="en-US" dirty="0" smtClean="0"/>
-              <a:t>Identify specific things about AD Module that irritate me enough to make me go fix them</a:t>
-            </a:r>
-          </a:p>
-          <a:p>
-            <a:r>
-              <a:rPr lang="en-US" dirty="0" smtClean="0"/>
-              <a:t>Demo AD Provider tricks</a:t>
-            </a:r>
-          </a:p>
-          <a:p>
-            <a:r>
-              <a:rPr lang="en-US" dirty="0" smtClean="0"/>
-              <a:t>Demo “Updated” Get-</a:t>
-            </a:r>
-            <a:r>
-              <a:rPr lang="en-US" dirty="0" err="1" smtClean="0"/>
-              <a:t>AdUser</a:t>
-            </a:r>
-            <a:r>
-              <a:rPr lang="en-US" dirty="0" smtClean="0"/>
-              <a:t> (the way it should work)</a:t>
-            </a:r>
-          </a:p>
-          <a:p>
-            <a:r>
-              <a:rPr lang="en-US" dirty="0" smtClean="0"/>
-              <a:t>Searching AD</a:t>
-            </a:r>
-          </a:p>
-          <a:p>
-            <a:r>
-              <a:rPr lang="en-US" dirty="0" smtClean="0"/>
-              <a:t>NOT how to Manage AD with PowerShell </a:t>
-            </a:r>
-          </a:p>
-          <a:p>
-            <a:pPr lvl="1"/>
-            <a:r>
-              <a:rPr lang="en-US" dirty="0" smtClean="0"/>
-              <a:t>There are much better people than I that have lots of great info out in the </a:t>
-            </a:r>
-            <a:r>
-              <a:rPr lang="en-US" dirty="0" err="1" smtClean="0"/>
-              <a:t>interwebs</a:t>
-            </a:r>
-            <a:r>
-              <a:rPr lang="en-US" dirty="0" smtClean="0"/>
-              <a:t> for this </a:t>
-            </a:r>
-          </a:p>
-          <a:p>
+              <a:t>Details of how to manage AD with PowerShell</a:t>
+            </a:r>
             <a:endParaRPr lang="en-US" dirty="0"/>
           </a:p>
         </p:txBody>
@@ -5945,13 +5885,20 @@
     </p:spTree>
     <p:extLst>
       <p:ext uri="{BB962C8B-B14F-4D97-AF65-F5344CB8AC3E}">
-        <p14:creationId xmlns:p14="http://schemas.microsoft.com/office/powerpoint/2010/main" val="90426035"/>
+        <p14:creationId xmlns:p14="http://schemas.microsoft.com/office/powerpoint/2010/main" val="4234785968"/>
       </p:ext>
     </p:extLst>
   </p:cSld>
   <p:clrMapOvr>
     <a:masterClrMapping/>
   </p:clrMapOvr>
+  <p:timing>
+    <p:tnLst>
+      <p:par>
+        <p:cTn id="1" dur="indefinite" restart="never" nodeType="tmRoot"/>
+      </p:par>
+    </p:tnLst>
+  </p:timing>
 </p:sld>
 </file>
 
@@ -5989,6 +5936,144 @@
           <a:p>
             <a:r>
               <a:rPr lang="en-US" dirty="0" smtClean="0"/>
+              <a:t>What I am Going to cover</a:t>
+            </a:r>
+            <a:endParaRPr lang="en-US" dirty="0"/>
+          </a:p>
+        </p:txBody>
+      </p:sp>
+      <p:sp>
+        <p:nvSpPr>
+          <p:cNvPr id="3" name="Content Placeholder 2"/>
+          <p:cNvSpPr>
+            <a:spLocks noGrp="1"/>
+          </p:cNvSpPr>
+          <p:nvPr>
+            <p:ph idx="1"/>
+          </p:nvPr>
+        </p:nvSpPr>
+        <p:spPr/>
+        <p:txBody>
+          <a:bodyPr>
+            <a:normAutofit/>
+          </a:bodyPr>
+          <a:lstStyle/>
+          <a:p>
+            <a:r>
+              <a:rPr lang="en-US" dirty="0"/>
+              <a:t>W</a:t>
+            </a:r>
+            <a:r>
+              <a:rPr lang="en-US" dirty="0" smtClean="0"/>
+              <a:t>hy I choose the MSFT AD PowerShell Module</a:t>
+            </a:r>
+          </a:p>
+          <a:p>
+            <a:r>
+              <a:rPr lang="en-US" dirty="0" smtClean="0"/>
+              <a:t>Identify specific things about AD Module that irritate me enough to make me go fix them</a:t>
+            </a:r>
+          </a:p>
+          <a:p>
+            <a:r>
+              <a:rPr lang="en-US" dirty="0" smtClean="0"/>
+              <a:t>Demo AD Provider tricks</a:t>
+            </a:r>
+          </a:p>
+          <a:p>
+            <a:r>
+              <a:rPr lang="en-US" dirty="0" smtClean="0"/>
+              <a:t>Demo “Updated” Get-</a:t>
+            </a:r>
+            <a:r>
+              <a:rPr lang="en-US" dirty="0" err="1" smtClean="0"/>
+              <a:t>AdUser</a:t>
+            </a:r>
+            <a:r>
+              <a:rPr lang="en-US" dirty="0" smtClean="0"/>
+              <a:t> (the way it should work)</a:t>
+            </a:r>
+          </a:p>
+          <a:p>
+            <a:r>
+              <a:rPr lang="en-US" dirty="0" smtClean="0"/>
+              <a:t>Demo Searching AD</a:t>
+            </a:r>
+          </a:p>
+          <a:p>
+            <a:pPr marL="0" indent="0">
+              <a:buNone/>
+            </a:pPr>
+            <a:endParaRPr lang="en-US" dirty="0"/>
+          </a:p>
+        </p:txBody>
+      </p:sp>
+    </p:spTree>
+    <p:extLst>
+      <p:ext uri="{BB962C8B-B14F-4D97-AF65-F5344CB8AC3E}">
+        <p14:creationId xmlns:p14="http://schemas.microsoft.com/office/powerpoint/2010/main" val="90426035"/>
+      </p:ext>
+    </p:extLst>
+  </p:cSld>
+  <p:clrMapOvr>
+    <a:masterClrMapping/>
+  </p:clrMapOvr>
+  <mc:AlternateContent xmlns:mc="http://schemas.openxmlformats.org/markup-compatibility/2006" xmlns:p14="http://schemas.microsoft.com/office/powerpoint/2010/main">
+    <mc:Choice Requires="p14">
+      <p:transition spd="slow" p14:dur="1600">
+        <p:blinds dir="vert"/>
+      </p:transition>
+    </mc:Choice>
+    <mc:Fallback xmlns="">
+      <p:transition spd="slow">
+        <p:blinds dir="vert"/>
+      </p:transition>
+    </mc:Fallback>
+  </mc:AlternateContent>
+  <p:timing>
+    <p:tnLst>
+      <p:par>
+        <p:cTn id="1" dur="indefinite" restart="never" nodeType="tmRoot"/>
+      </p:par>
+    </p:tnLst>
+  </p:timing>
+</p:sld>
+</file>
+
+<file path=ppt/slides/slide4.xml><?xml version="1.0" encoding="utf-8"?>
+<p:sld xmlns:a="http://schemas.openxmlformats.org/drawingml/2006/main" xmlns:r="http://schemas.openxmlformats.org/officeDocument/2006/relationships" xmlns:p="http://schemas.openxmlformats.org/presentationml/2006/main">
+  <p:cSld>
+    <p:spTree>
+      <p:nvGrpSpPr>
+        <p:cNvPr id="1" name=""/>
+        <p:cNvGrpSpPr/>
+        <p:nvPr/>
+      </p:nvGrpSpPr>
+      <p:grpSpPr>
+        <a:xfrm>
+          <a:off x="0" y="0"/>
+          <a:ext cx="0" cy="0"/>
+          <a:chOff x="0" y="0"/>
+          <a:chExt cx="0" cy="0"/>
+        </a:xfrm>
+      </p:grpSpPr>
+      <p:sp>
+        <p:nvSpPr>
+          <p:cNvPr id="2" name="Title 1"/>
+          <p:cNvSpPr>
+            <a:spLocks noGrp="1"/>
+          </p:cNvSpPr>
+          <p:nvPr>
+            <p:ph type="title"/>
+          </p:nvPr>
+        </p:nvSpPr>
+        <p:spPr/>
+        <p:txBody>
+          <a:bodyPr/>
+          <a:lstStyle/>
+          <a:p>
+            <a:r>
+              <a:rPr lang="en-US" dirty="0" smtClean="0"/>
               <a:t>PowerShell tools for AD</a:t>
             </a:r>
             <a:endParaRPr lang="en-US" dirty="0"/>
@@ -6069,7 +6154,7 @@
 </p:sld>
 </file>
 
-<file path=ppt/slides/slide4.xml><?xml version="1.0" encoding="utf-8"?>
+<file path=ppt/slides/slide5.xml><?xml version="1.0" encoding="utf-8"?>
 <p:sld xmlns:a="http://schemas.openxmlformats.org/drawingml/2006/main" xmlns:r="http://schemas.openxmlformats.org/officeDocument/2006/relationships" xmlns:p="http://schemas.openxmlformats.org/presentationml/2006/main">
   <p:cSld>
     <p:spTree>
@@ -6158,7 +6243,7 @@
           <a:p>
             <a:r>
               <a:rPr lang="en-US" dirty="0" smtClean="0"/>
-              <a:t>As a consultant, can’t always install 3</a:t>
+              <a:t>As a consultant, (or an IT guy in a large shop) I can’t always install 3</a:t>
             </a:r>
             <a:r>
               <a:rPr lang="en-US" baseline="30000" dirty="0" smtClean="0"/>
@@ -6166,7 +6251,7 @@
             </a:r>
             <a:r>
               <a:rPr lang="en-US" dirty="0" smtClean="0"/>
-              <a:t> party software on computers for customers</a:t>
+              <a:t> party software</a:t>
             </a:r>
           </a:p>
           <a:p>
@@ -6233,64 +6318,6 @@
     <p:extLst>
       <p:ext uri="{BB962C8B-B14F-4D97-AF65-F5344CB8AC3E}">
         <p14:creationId xmlns:p14="http://schemas.microsoft.com/office/powerpoint/2010/main" val="875550530"/>
-      </p:ext>
-    </p:extLst>
-  </p:cSld>
-  <p:clrMapOvr>
-    <a:masterClrMapping/>
-  </p:clrMapOvr>
-</p:sld>
-</file>
-
-<file path=ppt/slides/slide5.xml><?xml version="1.0" encoding="utf-8"?>
-<p:sld xmlns:a="http://schemas.openxmlformats.org/drawingml/2006/main" xmlns:r="http://schemas.openxmlformats.org/officeDocument/2006/relationships" xmlns:p="http://schemas.openxmlformats.org/presentationml/2006/main">
-  <p:cSld>
-    <p:spTree>
-      <p:nvGrpSpPr>
-        <p:cNvPr id="1" name=""/>
-        <p:cNvGrpSpPr/>
-        <p:nvPr/>
-      </p:nvGrpSpPr>
-      <p:grpSpPr>
-        <a:xfrm>
-          <a:off x="0" y="0"/>
-          <a:ext cx="0" cy="0"/>
-          <a:chOff x="0" y="0"/>
-          <a:chExt cx="0" cy="0"/>
-        </a:xfrm>
-      </p:grpSpPr>
-      <p:sp>
-        <p:nvSpPr>
-          <p:cNvPr id="2" name="Title 1"/>
-          <p:cNvSpPr>
-            <a:spLocks noGrp="1"/>
-          </p:cNvSpPr>
-          <p:nvPr>
-            <p:ph type="title"/>
-          </p:nvPr>
-        </p:nvSpPr>
-        <p:spPr>
-          <a:xfrm>
-            <a:off x="1898072" y="2685537"/>
-            <a:ext cx="8610600" cy="1293028"/>
-          </a:xfrm>
-        </p:spPr>
-        <p:txBody>
-          <a:bodyPr/>
-          <a:lstStyle/>
-          <a:p>
-            <a:r>
-              <a:rPr lang="en-US" dirty="0" smtClean="0"/>
-              <a:t>New-Demo “AD Provider”</a:t>
-            </a:r>
-            <a:endParaRPr lang="en-US" dirty="0"/>
-          </a:p>
-        </p:txBody>
-      </p:sp>
-    </p:spTree>
-    <p:extLst>
-      <p:ext uri="{BB962C8B-B14F-4D97-AF65-F5344CB8AC3E}">
-        <p14:creationId xmlns:p14="http://schemas.microsoft.com/office/powerpoint/2010/main" val="3792052023"/>
       </p:ext>
     </p:extLst>
   </p:cSld>
@@ -6329,6 +6356,64 @@
         </p:nvSpPr>
         <p:spPr>
           <a:xfrm>
+            <a:off x="1898072" y="2685537"/>
+            <a:ext cx="8610600" cy="1293028"/>
+          </a:xfrm>
+        </p:spPr>
+        <p:txBody>
+          <a:bodyPr/>
+          <a:lstStyle/>
+          <a:p>
+            <a:r>
+              <a:rPr lang="en-US" dirty="0" smtClean="0"/>
+              <a:t>New-Demo “AD Provider”</a:t>
+            </a:r>
+            <a:endParaRPr lang="en-US" dirty="0"/>
+          </a:p>
+        </p:txBody>
+      </p:sp>
+    </p:spTree>
+    <p:extLst>
+      <p:ext uri="{BB962C8B-B14F-4D97-AF65-F5344CB8AC3E}">
+        <p14:creationId xmlns:p14="http://schemas.microsoft.com/office/powerpoint/2010/main" val="3792052023"/>
+      </p:ext>
+    </p:extLst>
+  </p:cSld>
+  <p:clrMapOvr>
+    <a:masterClrMapping/>
+  </p:clrMapOvr>
+</p:sld>
+</file>
+
+<file path=ppt/slides/slide7.xml><?xml version="1.0" encoding="utf-8"?>
+<p:sld xmlns:a="http://schemas.openxmlformats.org/drawingml/2006/main" xmlns:r="http://schemas.openxmlformats.org/officeDocument/2006/relationships" xmlns:p="http://schemas.openxmlformats.org/presentationml/2006/main">
+  <p:cSld>
+    <p:spTree>
+      <p:nvGrpSpPr>
+        <p:cNvPr id="1" name=""/>
+        <p:cNvGrpSpPr/>
+        <p:nvPr/>
+      </p:nvGrpSpPr>
+      <p:grpSpPr>
+        <a:xfrm>
+          <a:off x="0" y="0"/>
+          <a:ext cx="0" cy="0"/>
+          <a:chOff x="0" y="0"/>
+          <a:chExt cx="0" cy="0"/>
+        </a:xfrm>
+      </p:grpSpPr>
+      <p:sp>
+        <p:nvSpPr>
+          <p:cNvPr id="2" name="Title 1"/>
+          <p:cNvSpPr>
+            <a:spLocks noGrp="1"/>
+          </p:cNvSpPr>
+          <p:nvPr>
+            <p:ph type="title"/>
+          </p:nvPr>
+        </p:nvSpPr>
+        <p:spPr>
+          <a:xfrm>
             <a:off x="1953491" y="2722483"/>
             <a:ext cx="8610600" cy="1293028"/>
           </a:xfrm>
@@ -6366,7 +6451,7 @@
 </p:sld>
 </file>
 
-<file path=ppt/slides/slide7.xml><?xml version="1.0" encoding="utf-8"?>
+<file path=ppt/slides/slide8.xml><?xml version="1.0" encoding="utf-8"?>
 <p:sld xmlns:a="http://schemas.openxmlformats.org/drawingml/2006/main" xmlns:r="http://schemas.openxmlformats.org/officeDocument/2006/relationships" xmlns:p="http://schemas.openxmlformats.org/presentationml/2006/main">
   <p:cSld>
     <p:spTree>

</xml_diff>

<commit_message>
latest version of AD Presentation
</commit_message>
<xml_diff>
--- a/PS Summit AD Tips and Tricks.pptx
+++ b/PS Summit AD Tips and Tricks.pptx
@@ -6,12 +6,13 @@
   </p:sldMasterIdLst>
   <p:sldIdLst>
     <p:sldId id="256" r:id="rId2"/>
-    <p:sldId id="265" r:id="rId3"/>
-    <p:sldId id="259" r:id="rId4"/>
-    <p:sldId id="258" r:id="rId5"/>
-    <p:sldId id="261" r:id="rId6"/>
-    <p:sldId id="262" r:id="rId7"/>
-    <p:sldId id="264" r:id="rId8"/>
+    <p:sldId id="266" r:id="rId3"/>
+    <p:sldId id="265" r:id="rId4"/>
+    <p:sldId id="259" r:id="rId5"/>
+    <p:sldId id="258" r:id="rId6"/>
+    <p:sldId id="261" r:id="rId7"/>
+    <p:sldId id="262" r:id="rId8"/>
+    <p:sldId id="264" r:id="rId9"/>
   </p:sldIdLst>
   <p:sldSz cx="12192000" cy="6858000"/>
   <p:notesSz cx="6858000" cy="9144000"/>
@@ -288,7 +289,7 @@
           <a:p>
             <a:fld id="{7195C811-8A6E-4F08-9E1B-F289D25AACC3}" type="datetimeFigureOut">
               <a:rPr lang="en-US" smtClean="0"/>
-              <a:t>4/18/2013</a:t>
+              <a:t>4/24/2013</a:t>
             </a:fld>
             <a:endParaRPr lang="en-US"/>
           </a:p>
@@ -563,7 +564,7 @@
           <a:p>
             <a:fld id="{7195C811-8A6E-4F08-9E1B-F289D25AACC3}" type="datetimeFigureOut">
               <a:rPr lang="en-US" smtClean="0"/>
-              <a:t>4/18/2013</a:t>
+              <a:t>4/24/2013</a:t>
             </a:fld>
             <a:endParaRPr lang="en-US"/>
           </a:p>
@@ -802,7 +803,7 @@
           <a:p>
             <a:fld id="{7195C811-8A6E-4F08-9E1B-F289D25AACC3}" type="datetimeFigureOut">
               <a:rPr lang="en-US" smtClean="0"/>
-              <a:t>4/18/2013</a:t>
+              <a:t>4/24/2013</a:t>
             </a:fld>
             <a:endParaRPr lang="en-US"/>
           </a:p>
@@ -1120,7 +1121,7 @@
           <a:p>
             <a:fld id="{7195C811-8A6E-4F08-9E1B-F289D25AACC3}" type="datetimeFigureOut">
               <a:rPr lang="en-US" smtClean="0"/>
-              <a:t>4/18/2013</a:t>
+              <a:t>4/24/2013</a:t>
             </a:fld>
             <a:endParaRPr lang="en-US"/>
           </a:p>
@@ -1601,7 +1602,7 @@
           <a:p>
             <a:fld id="{7195C811-8A6E-4F08-9E1B-F289D25AACC3}" type="datetimeFigureOut">
               <a:rPr lang="en-US" smtClean="0"/>
-              <a:t>4/18/2013</a:t>
+              <a:t>4/24/2013</a:t>
             </a:fld>
             <a:endParaRPr lang="en-US"/>
           </a:p>
@@ -2156,7 +2157,7 @@
           <a:p>
             <a:fld id="{7195C811-8A6E-4F08-9E1B-F289D25AACC3}" type="datetimeFigureOut">
               <a:rPr lang="en-US" smtClean="0"/>
-              <a:t>4/18/2013</a:t>
+              <a:t>4/24/2013</a:t>
             </a:fld>
             <a:endParaRPr lang="en-US"/>
           </a:p>
@@ -2938,7 +2939,7 @@
           <a:p>
             <a:fld id="{7195C811-8A6E-4F08-9E1B-F289D25AACC3}" type="datetimeFigureOut">
               <a:rPr lang="en-US" smtClean="0"/>
-              <a:t>4/18/2013</a:t>
+              <a:t>4/24/2013</a:t>
             </a:fld>
             <a:endParaRPr lang="en-US"/>
           </a:p>
@@ -3121,7 +3122,7 @@
           <a:p>
             <a:fld id="{7195C811-8A6E-4F08-9E1B-F289D25AACC3}" type="datetimeFigureOut">
               <a:rPr lang="en-US" smtClean="0"/>
-              <a:t>4/18/2013</a:t>
+              <a:t>4/24/2013</a:t>
             </a:fld>
             <a:endParaRPr lang="en-US"/>
           </a:p>
@@ -3352,7 +3353,7 @@
           <a:p>
             <a:fld id="{7195C811-8A6E-4F08-9E1B-F289D25AACC3}" type="datetimeFigureOut">
               <a:rPr lang="en-US" smtClean="0"/>
-              <a:t>4/18/2013</a:t>
+              <a:t>4/24/2013</a:t>
             </a:fld>
             <a:endParaRPr lang="en-US"/>
           </a:p>
@@ -3540,7 +3541,7 @@
           <a:p>
             <a:fld id="{7195C811-8A6E-4F08-9E1B-F289D25AACC3}" type="datetimeFigureOut">
               <a:rPr lang="en-US" smtClean="0"/>
-              <a:t>4/18/2013</a:t>
+              <a:t>4/24/2013</a:t>
             </a:fld>
             <a:endParaRPr lang="en-US"/>
           </a:p>
@@ -3837,7 +3838,7 @@
           <a:p>
             <a:fld id="{7195C811-8A6E-4F08-9E1B-F289D25AACC3}" type="datetimeFigureOut">
               <a:rPr lang="en-US" smtClean="0"/>
-              <a:t>4/18/2013</a:t>
+              <a:t>4/24/2013</a:t>
             </a:fld>
             <a:endParaRPr lang="en-US"/>
           </a:p>
@@ -4087,7 +4088,7 @@
           <a:p>
             <a:fld id="{7195C811-8A6E-4F08-9E1B-F289D25AACC3}" type="datetimeFigureOut">
               <a:rPr lang="en-US" smtClean="0"/>
-              <a:t>4/18/2013</a:t>
+              <a:t>4/24/2013</a:t>
             </a:fld>
             <a:endParaRPr lang="en-US"/>
           </a:p>
@@ -4474,7 +4475,7 @@
           <a:p>
             <a:fld id="{7195C811-8A6E-4F08-9E1B-F289D25AACC3}" type="datetimeFigureOut">
               <a:rPr lang="en-US" smtClean="0"/>
-              <a:t>4/18/2013</a:t>
+              <a:t>4/24/2013</a:t>
             </a:fld>
             <a:endParaRPr lang="en-US"/>
           </a:p>
@@ -4600,7 +4601,7 @@
           <a:p>
             <a:fld id="{7195C811-8A6E-4F08-9E1B-F289D25AACC3}" type="datetimeFigureOut">
               <a:rPr lang="en-US" smtClean="0"/>
-              <a:t>4/18/2013</a:t>
+              <a:t>4/24/2013</a:t>
             </a:fld>
             <a:endParaRPr lang="en-US"/>
           </a:p>
@@ -4703,7 +4704,7 @@
           <a:p>
             <a:fld id="{7195C811-8A6E-4F08-9E1B-F289D25AACC3}" type="datetimeFigureOut">
               <a:rPr lang="en-US" smtClean="0"/>
-              <a:t>4/18/2013</a:t>
+              <a:t>4/24/2013</a:t>
             </a:fld>
             <a:endParaRPr lang="en-US"/>
           </a:p>
@@ -4960,7 +4961,7 @@
           <a:p>
             <a:fld id="{7195C811-8A6E-4F08-9E1B-F289D25AACC3}" type="datetimeFigureOut">
               <a:rPr lang="en-US" smtClean="0"/>
-              <a:t>4/18/2013</a:t>
+              <a:t>4/24/2013</a:t>
             </a:fld>
             <a:endParaRPr lang="en-US"/>
           </a:p>
@@ -5225,7 +5226,7 @@
           <a:p>
             <a:fld id="{7195C811-8A6E-4F08-9E1B-F289D25AACC3}" type="datetimeFigureOut">
               <a:rPr lang="en-US" smtClean="0"/>
-              <a:t>4/18/2013</a:t>
+              <a:t>4/24/2013</a:t>
             </a:fld>
             <a:endParaRPr lang="en-US"/>
           </a:p>
@@ -5476,7 +5477,7 @@
           <a:p>
             <a:fld id="{7195C811-8A6E-4F08-9E1B-F289D25AACC3}" type="datetimeFigureOut">
               <a:rPr lang="en-US" smtClean="0"/>
-              <a:t>4/18/2013</a:t>
+              <a:t>4/24/2013</a:t>
             </a:fld>
             <a:endParaRPr lang="en-US"/>
           </a:p>
@@ -5912,11 +5913,11 @@
           <a:p>
             <a:r>
               <a:rPr lang="en-US" dirty="0" smtClean="0"/>
-              <a:t>PowerShell AD Tips </a:t>
+              <a:t>PowerShell </a:t>
             </a:r>
             <a:r>
               <a:rPr lang="en-US" dirty="0" smtClean="0"/>
-              <a:t>and Tricks</a:t>
+              <a:t>and Active directory</a:t>
             </a:r>
             <a:endParaRPr lang="en-US" dirty="0"/>
           </a:p>
@@ -5932,10 +5933,15 @@
             <p:ph type="subTitle" idx="1"/>
           </p:nvPr>
         </p:nvSpPr>
-        <p:spPr/>
+        <p:spPr>
+          <a:xfrm>
+            <a:off x="1371600" y="3632201"/>
+            <a:ext cx="9448800" cy="2030844"/>
+          </a:xfrm>
+        </p:spPr>
         <p:txBody>
           <a:bodyPr>
-            <a:normAutofit fontScale="92500" lnSpcReduction="10000"/>
+            <a:normAutofit fontScale="92500" lnSpcReduction="20000"/>
           </a:bodyPr>
           <a:lstStyle/>
           <a:p>
@@ -5947,7 +5953,35 @@
           <a:p>
             <a:r>
               <a:rPr lang="en-US" dirty="0" smtClean="0"/>
-              <a:t>PowerShell Summit 2013, Redmond WA</a:t>
+              <a:t>PowerShell Summit 2013, Redmond </a:t>
+            </a:r>
+            <a:r>
+              <a:rPr lang="en-US" dirty="0" smtClean="0"/>
+              <a:t>WA</a:t>
+            </a:r>
+          </a:p>
+          <a:p>
+            <a:r>
+              <a:rPr lang="en-US" dirty="0" smtClean="0"/>
+              <a:t>@andys146</a:t>
+            </a:r>
+          </a:p>
+          <a:p>
+            <a:r>
+              <a:rPr lang="en-US" dirty="0" smtClean="0"/>
+              <a:t>http://get-powershell.com</a:t>
+            </a:r>
+          </a:p>
+          <a:p>
+            <a:r>
+              <a:rPr lang="en-US" dirty="0" smtClean="0"/>
+              <a:t>Lead Engineer, Identity and Access Management, </a:t>
+            </a:r>
+          </a:p>
+          <a:p>
+            <a:r>
+              <a:rPr lang="en-US" dirty="0" smtClean="0"/>
+              <a:t>Avanade Inc.</a:t>
             </a:r>
             <a:endParaRPr lang="en-US" dirty="0"/>
           </a:p>
@@ -6008,14 +6042,19 @@
             <p:ph type="title"/>
           </p:nvPr>
         </p:nvSpPr>
-        <p:spPr/>
+        <p:spPr>
+          <a:xfrm>
+            <a:off x="4062844" y="764373"/>
+            <a:ext cx="7443355" cy="1293028"/>
+          </a:xfrm>
+        </p:spPr>
         <p:txBody>
           <a:bodyPr/>
           <a:lstStyle/>
           <a:p>
             <a:r>
               <a:rPr lang="en-US" dirty="0" smtClean="0"/>
-              <a:t>What’s not covered	</a:t>
+              <a:t>Deck and code</a:t>
             </a:r>
             <a:endParaRPr lang="en-US" dirty="0"/>
           </a:p>
@@ -6036,29 +6075,55 @@
           <a:bodyPr/>
           <a:lstStyle/>
           <a:p>
-            <a:r>
-              <a:rPr lang="en-US" dirty="0" smtClean="0"/>
-              <a:t>Details of how to manage AD with PowerShell</a:t>
-            </a:r>
-            <a:endParaRPr lang="en-US" dirty="0"/>
+            <a:endParaRPr lang="en-US" dirty="0" smtClean="0">
+              <a:hlinkClick r:id="rId2"/>
+            </a:endParaRPr>
+          </a:p>
+          <a:p>
+            <a:pPr marL="0" indent="0">
+              <a:buNone/>
+            </a:pPr>
+            <a:r>
+              <a:rPr lang="en-US" sz="2800" dirty="0" smtClean="0">
+                <a:hlinkClick r:id="rId2"/>
+              </a:rPr>
+              <a:t>https</a:t>
+            </a:r>
+            <a:r>
+              <a:rPr lang="en-US" sz="2800" dirty="0">
+                <a:hlinkClick r:id="rId2"/>
+              </a:rPr>
+              <a:t>://</a:t>
+            </a:r>
+            <a:r>
+              <a:rPr lang="en-US" sz="2800" dirty="0" smtClean="0">
+                <a:hlinkClick r:id="rId2"/>
+              </a:rPr>
+              <a:t>github.com/AndyPowerShell/PowerShellSummit</a:t>
+            </a:r>
+            <a:r>
+              <a:rPr lang="en-US" sz="2800" dirty="0" smtClean="0"/>
+              <a:t> </a:t>
+            </a:r>
+            <a:endParaRPr lang="en-US" sz="2800" dirty="0"/>
           </a:p>
         </p:txBody>
       </p:sp>
     </p:spTree>
     <p:extLst>
       <p:ext uri="{BB962C8B-B14F-4D97-AF65-F5344CB8AC3E}">
-        <p14:creationId xmlns:p14="http://schemas.microsoft.com/office/powerpoint/2010/main" val="4234785968"/>
+        <p14:creationId xmlns:p14="http://schemas.microsoft.com/office/powerpoint/2010/main" val="47741497"/>
       </p:ext>
     </p:extLst>
   </p:cSld>
   <p:clrMapOvr>
     <a:masterClrMapping/>
   </p:clrMapOvr>
-  <mc:AlternateContent xmlns:mc="http://schemas.openxmlformats.org/markup-compatibility/2006" xmlns:p14="http://schemas.microsoft.com/office/powerpoint/2010/main">
-    <mc:Choice Requires="p14">
+  <mc:AlternateContent xmlns:mc="http://schemas.openxmlformats.org/markup-compatibility/2006">
+    <mc:Choice xmlns:p14="http://schemas.microsoft.com/office/powerpoint/2010/main" Requires="p14">
       <p:transition spd="slow" p14:dur="2000"/>
     </mc:Choice>
-    <mc:Fallback xmlns="">
+    <mc:Fallback>
       <p:transition spd="slow"/>
     </mc:Fallback>
   </mc:AlternateContent>
@@ -6106,6 +6171,97 @@
           <a:p>
             <a:r>
               <a:rPr lang="en-US" dirty="0" smtClean="0"/>
+              <a:t>What’s not covered	</a:t>
+            </a:r>
+            <a:endParaRPr lang="en-US" dirty="0"/>
+          </a:p>
+        </p:txBody>
+      </p:sp>
+      <p:sp>
+        <p:nvSpPr>
+          <p:cNvPr id="3" name="Content Placeholder 2"/>
+          <p:cNvSpPr>
+            <a:spLocks noGrp="1"/>
+          </p:cNvSpPr>
+          <p:nvPr>
+            <p:ph idx="1"/>
+          </p:nvPr>
+        </p:nvSpPr>
+        <p:spPr/>
+        <p:txBody>
+          <a:bodyPr/>
+          <a:lstStyle/>
+          <a:p>
+            <a:r>
+              <a:rPr lang="en-US" dirty="0" smtClean="0"/>
+              <a:t>Details of how to manage AD with PowerShell</a:t>
+            </a:r>
+            <a:endParaRPr lang="en-US" dirty="0"/>
+          </a:p>
+        </p:txBody>
+      </p:sp>
+    </p:spTree>
+    <p:extLst>
+      <p:ext uri="{BB962C8B-B14F-4D97-AF65-F5344CB8AC3E}">
+        <p14:creationId xmlns:p14="http://schemas.microsoft.com/office/powerpoint/2010/main" val="4234785968"/>
+      </p:ext>
+    </p:extLst>
+  </p:cSld>
+  <p:clrMapOvr>
+    <a:masterClrMapping/>
+  </p:clrMapOvr>
+  <mc:AlternateContent xmlns:mc="http://schemas.openxmlformats.org/markup-compatibility/2006" xmlns:p14="http://schemas.microsoft.com/office/powerpoint/2010/main">
+    <mc:Choice Requires="p14">
+      <p:transition spd="slow" p14:dur="2000"/>
+    </mc:Choice>
+    <mc:Fallback xmlns="">
+      <p:transition spd="slow"/>
+    </mc:Fallback>
+  </mc:AlternateContent>
+  <p:timing>
+    <p:tnLst>
+      <p:par>
+        <p:cTn id="1" dur="indefinite" restart="never" nodeType="tmRoot"/>
+      </p:par>
+    </p:tnLst>
+  </p:timing>
+</p:sld>
+</file>
+
+<file path=ppt/slides/slide4.xml><?xml version="1.0" encoding="utf-8"?>
+<p:sld xmlns:a="http://schemas.openxmlformats.org/drawingml/2006/main" xmlns:r="http://schemas.openxmlformats.org/officeDocument/2006/relationships" xmlns:p="http://schemas.openxmlformats.org/presentationml/2006/main">
+  <p:cSld>
+    <p:spTree>
+      <p:nvGrpSpPr>
+        <p:cNvPr id="1" name=""/>
+        <p:cNvGrpSpPr/>
+        <p:nvPr/>
+      </p:nvGrpSpPr>
+      <p:grpSpPr>
+        <a:xfrm>
+          <a:off x="0" y="0"/>
+          <a:ext cx="0" cy="0"/>
+          <a:chOff x="0" y="0"/>
+          <a:chExt cx="0" cy="0"/>
+        </a:xfrm>
+      </p:grpSpPr>
+      <p:sp>
+        <p:nvSpPr>
+          <p:cNvPr id="2" name="Title 1"/>
+          <p:cNvSpPr>
+            <a:spLocks noGrp="1"/>
+          </p:cNvSpPr>
+          <p:nvPr>
+            <p:ph type="title"/>
+          </p:nvPr>
+        </p:nvSpPr>
+        <p:spPr/>
+        <p:txBody>
+          <a:bodyPr/>
+          <a:lstStyle/>
+          <a:p>
+            <a:r>
+              <a:rPr lang="en-US" dirty="0" smtClean="0"/>
               <a:t>What I am Going to cover</a:t>
             </a:r>
             <a:endParaRPr lang="en-US" dirty="0"/>
@@ -6129,13 +6285,19 @@
           </a:bodyPr>
           <a:lstStyle/>
           <a:p>
-            <a:r>
-              <a:rPr lang="en-US" dirty="0"/>
-              <a:t>W</a:t>
-            </a:r>
+            <a:pPr marL="0" indent="0">
+              <a:buNone/>
+            </a:pPr>
+            <a:endParaRPr lang="en-US" dirty="0" smtClean="0"/>
+          </a:p>
+          <a:p>
             <a:r>
               <a:rPr lang="en-US" dirty="0" smtClean="0"/>
-              <a:t>hy I choose the MSFT AD PowerShell Module</a:t>
+              <a:t>Why </a:t>
+            </a:r>
+            <a:r>
+              <a:rPr lang="en-US" dirty="0" smtClean="0"/>
+              <a:t>I choose the MSFT AD PowerShell Module</a:t>
             </a:r>
           </a:p>
           <a:p>
@@ -6161,14 +6323,31 @@
             </a:r>
             <a:r>
               <a:rPr lang="en-US" dirty="0" smtClean="0"/>
-              <a:t> (the way it should work)</a:t>
-            </a:r>
-          </a:p>
-          <a:p>
+              <a:t> (the way it should </a:t>
+            </a:r>
             <a:r>
               <a:rPr lang="en-US" dirty="0" smtClean="0"/>
-              <a:t>Demo Searching AD</a:t>
-            </a:r>
+              <a:t>work, in my humble opinion)</a:t>
+            </a:r>
+            <a:endParaRPr lang="en-US" dirty="0" smtClean="0"/>
+          </a:p>
+          <a:p>
+            <a:r>
+              <a:rPr lang="en-US" dirty="0" smtClean="0"/>
+              <a:t>AD Search Demo</a:t>
+            </a:r>
+          </a:p>
+          <a:p>
+            <a:r>
+              <a:rPr lang="en-US" dirty="0" smtClean="0"/>
+              <a:t>On the side.. Also think about design of Module, User experience, trade-offs</a:t>
+            </a:r>
+          </a:p>
+          <a:p>
+            <a:pPr marL="0" indent="0">
+              <a:buNone/>
+            </a:pPr>
+            <a:endParaRPr lang="en-US" dirty="0" smtClean="0"/>
           </a:p>
           <a:p>
             <a:pPr marL="0" indent="0">
@@ -6232,7 +6411,7 @@
                                         <p:tgtEl>
                                           <p:spTgt spid="3">
                                             <p:txEl>
-                                              <p:pRg st="0" end="0"/>
+                                              <p:pRg st="1" end="1"/>
                                             </p:txEl>
                                           </p:spTgt>
                                         </p:tgtEl>
@@ -6250,7 +6429,7 @@
                                         <p:tgtEl>
                                           <p:spTgt spid="3">
                                             <p:txEl>
-                                              <p:pRg st="0" end="0"/>
+                                              <p:pRg st="1" end="1"/>
                                             </p:txEl>
                                           </p:spTgt>
                                         </p:tgtEl>
@@ -6277,7 +6456,7 @@
                                         <p:tgtEl>
                                           <p:spTgt spid="3">
                                             <p:txEl>
-                                              <p:pRg st="0" end="0"/>
+                                              <p:pRg st="1" end="1"/>
                                             </p:txEl>
                                           </p:spTgt>
                                         </p:tgtEl>
@@ -6335,7 +6514,7 @@
                                         <p:tgtEl>
                                           <p:spTgt spid="3">
                                             <p:txEl>
-                                              <p:pRg st="1" end="1"/>
+                                              <p:pRg st="2" end="2"/>
                                             </p:txEl>
                                           </p:spTgt>
                                         </p:tgtEl>
@@ -6353,7 +6532,7 @@
                                         <p:tgtEl>
                                           <p:spTgt spid="3">
                                             <p:txEl>
-                                              <p:pRg st="1" end="1"/>
+                                              <p:pRg st="2" end="2"/>
                                             </p:txEl>
                                           </p:spTgt>
                                         </p:tgtEl>
@@ -6380,7 +6559,7 @@
                                         <p:tgtEl>
                                           <p:spTgt spid="3">
                                             <p:txEl>
-                                              <p:pRg st="1" end="1"/>
+                                              <p:pRg st="2" end="2"/>
                                             </p:txEl>
                                           </p:spTgt>
                                         </p:tgtEl>
@@ -6438,7 +6617,7 @@
                                         <p:tgtEl>
                                           <p:spTgt spid="3">
                                             <p:txEl>
-                                              <p:pRg st="2" end="2"/>
+                                              <p:pRg st="3" end="3"/>
                                             </p:txEl>
                                           </p:spTgt>
                                         </p:tgtEl>
@@ -6456,7 +6635,7 @@
                                         <p:tgtEl>
                                           <p:spTgt spid="3">
                                             <p:txEl>
-                                              <p:pRg st="2" end="2"/>
+                                              <p:pRg st="3" end="3"/>
                                             </p:txEl>
                                           </p:spTgt>
                                         </p:tgtEl>
@@ -6483,7 +6662,7 @@
                                         <p:tgtEl>
                                           <p:spTgt spid="3">
                                             <p:txEl>
-                                              <p:pRg st="2" end="2"/>
+                                              <p:pRg st="3" end="3"/>
                                             </p:txEl>
                                           </p:spTgt>
                                         </p:tgtEl>
@@ -6541,7 +6720,7 @@
                                         <p:tgtEl>
                                           <p:spTgt spid="3">
                                             <p:txEl>
-                                              <p:pRg st="3" end="3"/>
+                                              <p:pRg st="4" end="4"/>
                                             </p:txEl>
                                           </p:spTgt>
                                         </p:tgtEl>
@@ -6559,7 +6738,7 @@
                                         <p:tgtEl>
                                           <p:spTgt spid="3">
                                             <p:txEl>
-                                              <p:pRg st="3" end="3"/>
+                                              <p:pRg st="4" end="4"/>
                                             </p:txEl>
                                           </p:spTgt>
                                         </p:tgtEl>
@@ -6586,7 +6765,7 @@
                                         <p:tgtEl>
                                           <p:spTgt spid="3">
                                             <p:txEl>
-                                              <p:pRg st="3" end="3"/>
+                                              <p:pRg st="4" end="4"/>
                                             </p:txEl>
                                           </p:spTgt>
                                         </p:tgtEl>
@@ -6644,7 +6823,7 @@
                                         <p:tgtEl>
                                           <p:spTgt spid="3">
                                             <p:txEl>
-                                              <p:pRg st="4" end="4"/>
+                                              <p:pRg st="5" end="5"/>
                                             </p:txEl>
                                           </p:spTgt>
                                         </p:tgtEl>
@@ -6662,7 +6841,7 @@
                                         <p:tgtEl>
                                           <p:spTgt spid="3">
                                             <p:txEl>
-                                              <p:pRg st="4" end="4"/>
+                                              <p:pRg st="5" end="5"/>
                                             </p:txEl>
                                           </p:spTgt>
                                         </p:tgtEl>
@@ -6689,7 +6868,110 @@
                                         <p:tgtEl>
                                           <p:spTgt spid="3">
                                             <p:txEl>
-                                              <p:pRg st="4" end="4"/>
+                                              <p:pRg st="5" end="5"/>
+                                            </p:txEl>
+                                          </p:spTgt>
+                                        </p:tgtEl>
+                                        <p:attrNameLst>
+                                          <p:attrName>ppt_y</p:attrName>
+                                        </p:attrNameLst>
+                                      </p:cBhvr>
+                                      <p:tavLst>
+                                        <p:tav tm="0">
+                                          <p:val>
+                                            <p:strVal val="1+#ppt_h/2"/>
+                                          </p:val>
+                                        </p:tav>
+                                        <p:tav tm="100000">
+                                          <p:val>
+                                            <p:strVal val="#ppt_y"/>
+                                          </p:val>
+                                        </p:tav>
+                                      </p:tavLst>
+                                    </p:anim>
+                                  </p:childTnLst>
+                                </p:cTn>
+                              </p:par>
+                            </p:childTnLst>
+                          </p:cTn>
+                        </p:par>
+                      </p:childTnLst>
+                    </p:cTn>
+                  </p:par>
+                  <p:par>
+                    <p:cTn id="33" fill="hold">
+                      <p:stCondLst>
+                        <p:cond delay="indefinite"/>
+                      </p:stCondLst>
+                      <p:childTnLst>
+                        <p:par>
+                          <p:cTn id="34" fill="hold">
+                            <p:stCondLst>
+                              <p:cond delay="0"/>
+                            </p:stCondLst>
+                            <p:childTnLst>
+                              <p:par>
+                                <p:cTn id="35" presetID="2" presetClass="entr" presetSubtype="4" fill="hold" nodeType="clickEffect">
+                                  <p:stCondLst>
+                                    <p:cond delay="0"/>
+                                  </p:stCondLst>
+                                  <p:childTnLst>
+                                    <p:set>
+                                      <p:cBhvr>
+                                        <p:cTn id="36" dur="1" fill="hold">
+                                          <p:stCondLst>
+                                            <p:cond delay="0"/>
+                                          </p:stCondLst>
+                                        </p:cTn>
+                                        <p:tgtEl>
+                                          <p:spTgt spid="3">
+                                            <p:txEl>
+                                              <p:pRg st="6" end="6"/>
+                                            </p:txEl>
+                                          </p:spTgt>
+                                        </p:tgtEl>
+                                        <p:attrNameLst>
+                                          <p:attrName>style.visibility</p:attrName>
+                                        </p:attrNameLst>
+                                      </p:cBhvr>
+                                      <p:to>
+                                        <p:strVal val="visible"/>
+                                      </p:to>
+                                    </p:set>
+                                    <p:anim calcmode="lin" valueType="num">
+                                      <p:cBhvr additive="base">
+                                        <p:cTn id="37" dur="500" fill="hold"/>
+                                        <p:tgtEl>
+                                          <p:spTgt spid="3">
+                                            <p:txEl>
+                                              <p:pRg st="6" end="6"/>
+                                            </p:txEl>
+                                          </p:spTgt>
+                                        </p:tgtEl>
+                                        <p:attrNameLst>
+                                          <p:attrName>ppt_x</p:attrName>
+                                        </p:attrNameLst>
+                                      </p:cBhvr>
+                                      <p:tavLst>
+                                        <p:tav tm="0">
+                                          <p:val>
+                                            <p:strVal val="#ppt_x"/>
+                                          </p:val>
+                                        </p:tav>
+                                        <p:tav tm="100000">
+                                          <p:val>
+                                            <p:strVal val="#ppt_x"/>
+                                          </p:val>
+                                        </p:tav>
+                                      </p:tavLst>
+                                    </p:anim>
+                                    <p:anim calcmode="lin" valueType="num">
+                                      <p:cBhvr additive="base">
+                                        <p:cTn id="38" dur="500" fill="hold"/>
+                                        <p:tgtEl>
+                                          <p:spTgt spid="3">
+                                            <p:txEl>
+                                              <p:pRg st="6" end="6"/>
                                             </p:txEl>
                                           </p:spTgt>
                                         </p:tgtEl>
@@ -6744,7 +7026,7 @@
 </p:sld>
 </file>
 
-<file path=ppt/slides/slide4.xml><?xml version="1.0" encoding="utf-8"?>
+<file path=ppt/slides/slide5.xml><?xml version="1.0" encoding="utf-8"?>
 <p:sld xmlns:a="http://schemas.openxmlformats.org/drawingml/2006/main" xmlns:r="http://schemas.openxmlformats.org/officeDocument/2006/relationships" xmlns:p="http://schemas.openxmlformats.org/presentationml/2006/main">
   <p:cSld>
     <p:spTree>
@@ -6799,13 +7081,8 @@
             </a:r>
             <a:r>
               <a:rPr lang="en-US" dirty="0" smtClean="0"/>
-              <a:t> party </a:t>
-            </a:r>
-            <a:r>
-              <a:rPr lang="en-US" dirty="0" smtClean="0"/>
-              <a:t>software (like Quest AD tools)</a:t>
-            </a:r>
-            <a:endParaRPr lang="en-US" dirty="0" smtClean="0"/>
+              <a:t> party software (like Quest AD tools)</a:t>
+            </a:r>
           </a:p>
           <a:p>
             <a:r>
@@ -7677,7 +7954,7 @@
 </p:sld>
 </file>
 
-<file path=ppt/slides/slide5.xml><?xml version="1.0" encoding="utf-8"?>
+<file path=ppt/slides/slide6.xml><?xml version="1.0" encoding="utf-8"?>
 <p:sld xmlns:a="http://schemas.openxmlformats.org/drawingml/2006/main" xmlns:r="http://schemas.openxmlformats.org/officeDocument/2006/relationships" xmlns:p="http://schemas.openxmlformats.org/presentationml/2006/main">
   <p:cSld>
     <p:spTree>
@@ -7750,7 +8027,7 @@
 </p:sld>
 </file>
 
-<file path=ppt/slides/slide6.xml><?xml version="1.0" encoding="utf-8"?>
+<file path=ppt/slides/slide7.xml><?xml version="1.0" encoding="utf-8"?>
 <p:sld xmlns:a="http://schemas.openxmlformats.org/drawingml/2006/main" xmlns:r="http://schemas.openxmlformats.org/officeDocument/2006/relationships" xmlns:p="http://schemas.openxmlformats.org/presentationml/2006/main">
   <p:cSld>
     <p:spTree>
@@ -7831,7 +8108,7 @@
 </p:sld>
 </file>
 
-<file path=ppt/slides/slide7.xml><?xml version="1.0" encoding="utf-8"?>
+<file path=ppt/slides/slide8.xml><?xml version="1.0" encoding="utf-8"?>
 <p:sld xmlns:a="http://schemas.openxmlformats.org/drawingml/2006/main" xmlns:r="http://schemas.openxmlformats.org/officeDocument/2006/relationships" xmlns:p="http://schemas.openxmlformats.org/presentationml/2006/main">
   <p:cSld>
     <p:spTree>

</xml_diff>